<commit_message>
add timetable to presentation
</commit_message>
<xml_diff>
--- a/Presentation/File System extension_initial presentation.pptx
+++ b/Presentation/File System extension_initial presentation.pptx
@@ -1,9 +1,12 @@
 
 <file path=ppt/presentation.xml><?xml version="1.0" encoding="utf-8"?>
-<p:presentation xmlns:a="http://schemas.openxmlformats.org/drawingml/2006/main" xmlns:r="http://schemas.openxmlformats.org/officeDocument/2006/relationships" xmlns:p="http://schemas.openxmlformats.org/presentationml/2006/main" saveSubsetFonts="1">
+<p:presentation xmlns:a="http://schemas.openxmlformats.org/drawingml/2006/main" xmlns:r="http://schemas.openxmlformats.org/officeDocument/2006/relationships" xmlns:p="http://schemas.openxmlformats.org/presentationml/2006/main" showSpecialPlsOnTitleSld="0" saveSubsetFonts="1">
   <p:sldMasterIdLst>
     <p:sldMasterId id="2147483648" r:id="rId1"/>
   </p:sldMasterIdLst>
+  <p:notesMasterIdLst>
+    <p:notesMasterId r:id="rId6"/>
+  </p:notesMasterIdLst>
   <p:sldIdLst>
     <p:sldId id="256" r:id="rId2"/>
     <p:sldId id="257" r:id="rId3"/>
@@ -126,6 +129,356 @@
 </p:presentation>
 </file>
 
+<file path=ppt/notesMasters/notesMaster1.xml><?xml version="1.0" encoding="utf-8"?>
+<p:notesMaster xmlns:a="http://schemas.openxmlformats.org/drawingml/2006/main" xmlns:r="http://schemas.openxmlformats.org/officeDocument/2006/relationships" xmlns:p="http://schemas.openxmlformats.org/presentationml/2006/main">
+  <p:cSld>
+    <p:bg>
+      <p:bgRef idx="1001">
+        <a:schemeClr val="bg1"/>
+      </p:bgRef>
+    </p:bg>
+    <p:spTree>
+      <p:nvGrpSpPr>
+        <p:cNvPr id="1" name=""/>
+        <p:cNvGrpSpPr/>
+        <p:nvPr/>
+      </p:nvGrpSpPr>
+      <p:grpSpPr>
+        <a:xfrm>
+          <a:off x="0" y="0"/>
+          <a:ext cx="0" cy="0"/>
+          <a:chOff x="0" y="0"/>
+          <a:chExt cx="0" cy="0"/>
+        </a:xfrm>
+      </p:grpSpPr>
+      <p:sp>
+        <p:nvSpPr>
+          <p:cNvPr id="2" name="Kopfzeilenplatzhalter 1"/>
+          <p:cNvSpPr>
+            <a:spLocks noGrp="1"/>
+          </p:cNvSpPr>
+          <p:nvPr>
+            <p:ph type="hdr" sz="quarter"/>
+          </p:nvPr>
+        </p:nvSpPr>
+        <p:spPr>
+          <a:xfrm>
+            <a:off x="0" y="0"/>
+            <a:ext cx="2971800" cy="458788"/>
+          </a:xfrm>
+          <a:prstGeom prst="rect">
+            <a:avLst/>
+          </a:prstGeom>
+        </p:spPr>
+        <p:txBody>
+          <a:bodyPr vert="horz" lIns="91440" tIns="45720" rIns="91440" bIns="45720" rtlCol="0"/>
+          <a:lstStyle>
+            <a:lvl1pPr algn="l">
+              <a:defRPr sz="1200"/>
+            </a:lvl1pPr>
+          </a:lstStyle>
+          <a:p>
+            <a:endParaRPr lang="de-CH"/>
+          </a:p>
+        </p:txBody>
+      </p:sp>
+      <p:sp>
+        <p:nvSpPr>
+          <p:cNvPr id="3" name="Datumsplatzhalter 2"/>
+          <p:cNvSpPr>
+            <a:spLocks noGrp="1"/>
+          </p:cNvSpPr>
+          <p:nvPr>
+            <p:ph type="dt" idx="1"/>
+          </p:nvPr>
+        </p:nvSpPr>
+        <p:spPr>
+          <a:xfrm>
+            <a:off x="3884613" y="0"/>
+            <a:ext cx="2971800" cy="458788"/>
+          </a:xfrm>
+          <a:prstGeom prst="rect">
+            <a:avLst/>
+          </a:prstGeom>
+        </p:spPr>
+        <p:txBody>
+          <a:bodyPr vert="horz" lIns="91440" tIns="45720" rIns="91440" bIns="45720" rtlCol="0"/>
+          <a:lstStyle>
+            <a:lvl1pPr algn="r">
+              <a:defRPr sz="1200"/>
+            </a:lvl1pPr>
+          </a:lstStyle>
+          <a:p>
+            <a:fld id="{B59ECB9A-DBA8-4CFA-84B1-5C1145DF3001}" type="datetimeFigureOut">
+              <a:rPr lang="de-CH" smtClean="0"/>
+              <a:t>02.04.2024</a:t>
+            </a:fld>
+            <a:endParaRPr lang="de-CH"/>
+          </a:p>
+        </p:txBody>
+      </p:sp>
+      <p:sp>
+        <p:nvSpPr>
+          <p:cNvPr id="4" name="Folienbildplatzhalter 3"/>
+          <p:cNvSpPr>
+            <a:spLocks noGrp="1" noRot="1" noChangeAspect="1"/>
+          </p:cNvSpPr>
+          <p:nvPr>
+            <p:ph type="sldImg" idx="2"/>
+          </p:nvPr>
+        </p:nvSpPr>
+        <p:spPr>
+          <a:xfrm>
+            <a:off x="685800" y="1143000"/>
+            <a:ext cx="5486400" cy="3086100"/>
+          </a:xfrm>
+          <a:prstGeom prst="rect">
+            <a:avLst/>
+          </a:prstGeom>
+          <a:noFill/>
+          <a:ln w="12700">
+            <a:solidFill>
+              <a:prstClr val="black"/>
+            </a:solidFill>
+          </a:ln>
+        </p:spPr>
+        <p:txBody>
+          <a:bodyPr vert="horz" lIns="91440" tIns="45720" rIns="91440" bIns="45720" rtlCol="0" anchor="ctr"/>
+          <a:lstStyle/>
+          <a:p>
+            <a:endParaRPr lang="de-CH"/>
+          </a:p>
+        </p:txBody>
+      </p:sp>
+      <p:sp>
+        <p:nvSpPr>
+          <p:cNvPr id="5" name="Notizenplatzhalter 4"/>
+          <p:cNvSpPr>
+            <a:spLocks noGrp="1"/>
+          </p:cNvSpPr>
+          <p:nvPr>
+            <p:ph type="body" sz="quarter" idx="3"/>
+          </p:nvPr>
+        </p:nvSpPr>
+        <p:spPr>
+          <a:xfrm>
+            <a:off x="685800" y="4400550"/>
+            <a:ext cx="5486400" cy="3600450"/>
+          </a:xfrm>
+          <a:prstGeom prst="rect">
+            <a:avLst/>
+          </a:prstGeom>
+        </p:spPr>
+        <p:txBody>
+          <a:bodyPr vert="horz" lIns="91440" tIns="45720" rIns="91440" bIns="45720" rtlCol="0"/>
+          <a:lstStyle/>
+          <a:p>
+            <a:pPr lvl="0"/>
+            <a:r>
+              <a:rPr lang="de-DE"/>
+              <a:t>Mastertextformat bearbeiten</a:t>
+            </a:r>
+          </a:p>
+          <a:p>
+            <a:pPr lvl="1"/>
+            <a:r>
+              <a:rPr lang="de-DE"/>
+              <a:t>Zweite Ebene</a:t>
+            </a:r>
+          </a:p>
+          <a:p>
+            <a:pPr lvl="2"/>
+            <a:r>
+              <a:rPr lang="de-DE"/>
+              <a:t>Dritte Ebene</a:t>
+            </a:r>
+          </a:p>
+          <a:p>
+            <a:pPr lvl="3"/>
+            <a:r>
+              <a:rPr lang="de-DE"/>
+              <a:t>Vierte Ebene</a:t>
+            </a:r>
+          </a:p>
+          <a:p>
+            <a:pPr lvl="4"/>
+            <a:r>
+              <a:rPr lang="de-DE"/>
+              <a:t>Fünfte Ebene</a:t>
+            </a:r>
+            <a:endParaRPr lang="de-CH"/>
+          </a:p>
+        </p:txBody>
+      </p:sp>
+      <p:sp>
+        <p:nvSpPr>
+          <p:cNvPr id="6" name="Fußzeilenplatzhalter 5"/>
+          <p:cNvSpPr>
+            <a:spLocks noGrp="1"/>
+          </p:cNvSpPr>
+          <p:nvPr>
+            <p:ph type="ftr" sz="quarter" idx="4"/>
+          </p:nvPr>
+        </p:nvSpPr>
+        <p:spPr>
+          <a:xfrm>
+            <a:off x="0" y="8685213"/>
+            <a:ext cx="2971800" cy="458787"/>
+          </a:xfrm>
+          <a:prstGeom prst="rect">
+            <a:avLst/>
+          </a:prstGeom>
+        </p:spPr>
+        <p:txBody>
+          <a:bodyPr vert="horz" lIns="91440" tIns="45720" rIns="91440" bIns="45720" rtlCol="0" anchor="b"/>
+          <a:lstStyle>
+            <a:lvl1pPr algn="l">
+              <a:defRPr sz="1200"/>
+            </a:lvl1pPr>
+          </a:lstStyle>
+          <a:p>
+            <a:endParaRPr lang="de-CH"/>
+          </a:p>
+        </p:txBody>
+      </p:sp>
+      <p:sp>
+        <p:nvSpPr>
+          <p:cNvPr id="7" name="Foliennummernplatzhalter 6"/>
+          <p:cNvSpPr>
+            <a:spLocks noGrp="1"/>
+          </p:cNvSpPr>
+          <p:nvPr>
+            <p:ph type="sldNum" sz="quarter" idx="5"/>
+          </p:nvPr>
+        </p:nvSpPr>
+        <p:spPr>
+          <a:xfrm>
+            <a:off x="3884613" y="8685213"/>
+            <a:ext cx="2971800" cy="458787"/>
+          </a:xfrm>
+          <a:prstGeom prst="rect">
+            <a:avLst/>
+          </a:prstGeom>
+        </p:spPr>
+        <p:txBody>
+          <a:bodyPr vert="horz" lIns="91440" tIns="45720" rIns="91440" bIns="45720" rtlCol="0" anchor="b"/>
+          <a:lstStyle>
+            <a:lvl1pPr algn="r">
+              <a:defRPr sz="1200"/>
+            </a:lvl1pPr>
+          </a:lstStyle>
+          <a:p>
+            <a:fld id="{B687A45C-DF42-454D-AB0C-67E6F0221FB0}" type="slidenum">
+              <a:rPr lang="de-CH" smtClean="0"/>
+              <a:t>‹Nr.›</a:t>
+            </a:fld>
+            <a:endParaRPr lang="de-CH"/>
+          </a:p>
+        </p:txBody>
+      </p:sp>
+    </p:spTree>
+    <p:extLst>
+      <p:ext uri="{BB962C8B-B14F-4D97-AF65-F5344CB8AC3E}">
+        <p14:creationId xmlns:p14="http://schemas.microsoft.com/office/powerpoint/2010/main" val="3024676691"/>
+      </p:ext>
+    </p:extLst>
+  </p:cSld>
+  <p:clrMap bg1="lt1" tx1="dk1" bg2="lt2" tx2="dk2" accent1="accent1" accent2="accent2" accent3="accent3" accent4="accent4" accent5="accent5" accent6="accent6" hlink="hlink" folHlink="folHlink"/>
+  <p:notesStyle>
+    <a:lvl1pPr marL="0" algn="l" defTabSz="914400" rtl="0" eaLnBrk="1" latinLnBrk="0" hangingPunct="1">
+      <a:defRPr sz="1200" kern="1200">
+        <a:solidFill>
+          <a:schemeClr val="tx1"/>
+        </a:solidFill>
+        <a:latin typeface="+mn-lt"/>
+        <a:ea typeface="+mn-ea"/>
+        <a:cs typeface="+mn-cs"/>
+      </a:defRPr>
+    </a:lvl1pPr>
+    <a:lvl2pPr marL="457200" algn="l" defTabSz="914400" rtl="0" eaLnBrk="1" latinLnBrk="0" hangingPunct="1">
+      <a:defRPr sz="1200" kern="1200">
+        <a:solidFill>
+          <a:schemeClr val="tx1"/>
+        </a:solidFill>
+        <a:latin typeface="+mn-lt"/>
+        <a:ea typeface="+mn-ea"/>
+        <a:cs typeface="+mn-cs"/>
+      </a:defRPr>
+    </a:lvl2pPr>
+    <a:lvl3pPr marL="914400" algn="l" defTabSz="914400" rtl="0" eaLnBrk="1" latinLnBrk="0" hangingPunct="1">
+      <a:defRPr sz="1200" kern="1200">
+        <a:solidFill>
+          <a:schemeClr val="tx1"/>
+        </a:solidFill>
+        <a:latin typeface="+mn-lt"/>
+        <a:ea typeface="+mn-ea"/>
+        <a:cs typeface="+mn-cs"/>
+      </a:defRPr>
+    </a:lvl3pPr>
+    <a:lvl4pPr marL="1371600" algn="l" defTabSz="914400" rtl="0" eaLnBrk="1" latinLnBrk="0" hangingPunct="1">
+      <a:defRPr sz="1200" kern="1200">
+        <a:solidFill>
+          <a:schemeClr val="tx1"/>
+        </a:solidFill>
+        <a:latin typeface="+mn-lt"/>
+        <a:ea typeface="+mn-ea"/>
+        <a:cs typeface="+mn-cs"/>
+      </a:defRPr>
+    </a:lvl4pPr>
+    <a:lvl5pPr marL="1828800" algn="l" defTabSz="914400" rtl="0" eaLnBrk="1" latinLnBrk="0" hangingPunct="1">
+      <a:defRPr sz="1200" kern="1200">
+        <a:solidFill>
+          <a:schemeClr val="tx1"/>
+        </a:solidFill>
+        <a:latin typeface="+mn-lt"/>
+        <a:ea typeface="+mn-ea"/>
+        <a:cs typeface="+mn-cs"/>
+      </a:defRPr>
+    </a:lvl5pPr>
+    <a:lvl6pPr marL="2286000" algn="l" defTabSz="914400" rtl="0" eaLnBrk="1" latinLnBrk="0" hangingPunct="1">
+      <a:defRPr sz="1200" kern="1200">
+        <a:solidFill>
+          <a:schemeClr val="tx1"/>
+        </a:solidFill>
+        <a:latin typeface="+mn-lt"/>
+        <a:ea typeface="+mn-ea"/>
+        <a:cs typeface="+mn-cs"/>
+      </a:defRPr>
+    </a:lvl6pPr>
+    <a:lvl7pPr marL="2743200" algn="l" defTabSz="914400" rtl="0" eaLnBrk="1" latinLnBrk="0" hangingPunct="1">
+      <a:defRPr sz="1200" kern="1200">
+        <a:solidFill>
+          <a:schemeClr val="tx1"/>
+        </a:solidFill>
+        <a:latin typeface="+mn-lt"/>
+        <a:ea typeface="+mn-ea"/>
+        <a:cs typeface="+mn-cs"/>
+      </a:defRPr>
+    </a:lvl7pPr>
+    <a:lvl8pPr marL="3200400" algn="l" defTabSz="914400" rtl="0" eaLnBrk="1" latinLnBrk="0" hangingPunct="1">
+      <a:defRPr sz="1200" kern="1200">
+        <a:solidFill>
+          <a:schemeClr val="tx1"/>
+        </a:solidFill>
+        <a:latin typeface="+mn-lt"/>
+        <a:ea typeface="+mn-ea"/>
+        <a:cs typeface="+mn-cs"/>
+      </a:defRPr>
+    </a:lvl8pPr>
+    <a:lvl9pPr marL="3657600" algn="l" defTabSz="914400" rtl="0" eaLnBrk="1" latinLnBrk="0" hangingPunct="1">
+      <a:defRPr sz="1200" kern="1200">
+        <a:solidFill>
+          <a:schemeClr val="tx1"/>
+        </a:solidFill>
+        <a:latin typeface="+mn-lt"/>
+        <a:ea typeface="+mn-ea"/>
+        <a:cs typeface="+mn-cs"/>
+      </a:defRPr>
+    </a:lvl9pPr>
+  </p:notesStyle>
+</p:notesMaster>
+</file>
+
 <file path=ppt/slideLayouts/slideLayout1.xml><?xml version="1.0" encoding="utf-8"?>
 <p:sldLayout xmlns:a="http://schemas.openxmlformats.org/drawingml/2006/main" xmlns:r="http://schemas.openxmlformats.org/officeDocument/2006/relationships" xmlns:p="http://schemas.openxmlformats.org/presentationml/2006/main" type="title" preserve="1">
   <p:cSld name="Titelfolie">
@@ -273,9 +626,9 @@
           <a:bodyPr/>
           <a:lstStyle/>
           <a:p>
-            <a:fld id="{AC48E7B0-EC00-4138-BD16-7BD5FD72E830}" type="datetimeFigureOut">
+            <a:fld id="{60876351-051D-416D-A439-98D2041E1D1E}" type="datetime1">
               <a:rPr lang="de-CH" smtClean="0"/>
-              <a:t>30.03.2024</a:t>
+              <a:t>02.04.2024</a:t>
             </a:fld>
             <a:endParaRPr lang="de-CH"/>
           </a:p>
@@ -325,13 +678,22 @@
         <p:spPr/>
         <p:txBody>
           <a:bodyPr/>
-          <a:lstStyle/>
+          <a:lstStyle>
+            <a:lvl1pPr>
+              <a:defRPr sz="2000" b="1">
+                <a:solidFill>
+                  <a:schemeClr val="tx1"/>
+                </a:solidFill>
+              </a:defRPr>
+            </a:lvl1pPr>
+          </a:lstStyle>
           <a:p>
             <a:fld id="{6CC38E0F-6087-4576-8364-C865CA5816FE}" type="slidenum">
               <a:rPr lang="de-CH" smtClean="0"/>
+              <a:pPr/>
               <a:t>‹Nr.›</a:t>
             </a:fld>
-            <a:endParaRPr lang="de-CH"/>
+            <a:endParaRPr lang="de-CH" dirty="0"/>
           </a:p>
         </p:txBody>
       </p:sp>
@@ -489,9 +851,9 @@
           <a:bodyPr/>
           <a:lstStyle/>
           <a:p>
-            <a:fld id="{AC48E7B0-EC00-4138-BD16-7BD5FD72E830}" type="datetimeFigureOut">
+            <a:fld id="{DBEE2D96-60FA-4D4F-B4AD-9B75E837A9D1}" type="datetime1">
               <a:rPr lang="de-CH" smtClean="0"/>
-              <a:t>30.03.2024</a:t>
+              <a:t>02.04.2024</a:t>
             </a:fld>
             <a:endParaRPr lang="de-CH"/>
           </a:p>
@@ -699,9 +1061,9 @@
           <a:bodyPr/>
           <a:lstStyle/>
           <a:p>
-            <a:fld id="{AC48E7B0-EC00-4138-BD16-7BD5FD72E830}" type="datetimeFigureOut">
+            <a:fld id="{B4B9D651-8012-48C8-85FC-3DD86D04B6B2}" type="datetime1">
               <a:rPr lang="de-CH" smtClean="0"/>
-              <a:t>30.03.2024</a:t>
+              <a:t>02.04.2024</a:t>
             </a:fld>
             <a:endParaRPr lang="de-CH"/>
           </a:p>
@@ -899,9 +1261,9 @@
           <a:bodyPr/>
           <a:lstStyle/>
           <a:p>
-            <a:fld id="{AC48E7B0-EC00-4138-BD16-7BD5FD72E830}" type="datetimeFigureOut">
+            <a:fld id="{99ABBB5C-D7FB-45E5-9890-ED8CB48B57F4}" type="datetime1">
               <a:rPr lang="de-CH" smtClean="0"/>
-              <a:t>30.03.2024</a:t>
+              <a:t>02.04.2024</a:t>
             </a:fld>
             <a:endParaRPr lang="de-CH"/>
           </a:p>
@@ -971,6 +1333,22 @@
   <p:clrMapOvr>
     <a:masterClrMapping/>
   </p:clrMapOvr>
+  <p:extLst>
+    <p:ext uri="{DCECCB84-F9BA-43D5-87BE-67443E8EF086}">
+      <p15:sldGuideLst xmlns:p15="http://schemas.microsoft.com/office/powerpoint/2012/main">
+        <p15:guide id="1" orient="horz" pos="2160" userDrawn="1">
+          <p15:clr>
+            <a:srgbClr val="FBAE40"/>
+          </p15:clr>
+        </p15:guide>
+        <p15:guide id="2" pos="3840" userDrawn="1">
+          <p15:clr>
+            <a:srgbClr val="FBAE40"/>
+          </p15:clr>
+        </p15:guide>
+      </p15:sldGuideLst>
+    </p:ext>
+  </p:extLst>
 </p:sldLayout>
 </file>
 
@@ -1175,9 +1553,9 @@
           <a:bodyPr/>
           <a:lstStyle/>
           <a:p>
-            <a:fld id="{AC48E7B0-EC00-4138-BD16-7BD5FD72E830}" type="datetimeFigureOut">
+            <a:fld id="{85E4668A-1C27-4EB1-BAFF-A62D3349D197}" type="datetime1">
               <a:rPr lang="de-CH" smtClean="0"/>
-              <a:t>30.03.2024</a:t>
+              <a:t>02.04.2024</a:t>
             </a:fld>
             <a:endParaRPr lang="de-CH"/>
           </a:p>
@@ -1443,9 +1821,9 @@
           <a:bodyPr/>
           <a:lstStyle/>
           <a:p>
-            <a:fld id="{AC48E7B0-EC00-4138-BD16-7BD5FD72E830}" type="datetimeFigureOut">
+            <a:fld id="{CA33B258-3B92-42BA-9B85-EA6232CDD6A2}" type="datetime1">
               <a:rPr lang="de-CH" smtClean="0"/>
-              <a:t>30.03.2024</a:t>
+              <a:t>02.04.2024</a:t>
             </a:fld>
             <a:endParaRPr lang="de-CH"/>
           </a:p>
@@ -1858,9 +2236,9 @@
           <a:bodyPr/>
           <a:lstStyle/>
           <a:p>
-            <a:fld id="{AC48E7B0-EC00-4138-BD16-7BD5FD72E830}" type="datetimeFigureOut">
+            <a:fld id="{094180E7-6074-41E3-AAD7-AE8269F13D35}" type="datetime1">
               <a:rPr lang="de-CH" smtClean="0"/>
-              <a:t>30.03.2024</a:t>
+              <a:t>02.04.2024</a:t>
             </a:fld>
             <a:endParaRPr lang="de-CH"/>
           </a:p>
@@ -2000,9 +2378,9 @@
           <a:bodyPr/>
           <a:lstStyle/>
           <a:p>
-            <a:fld id="{AC48E7B0-EC00-4138-BD16-7BD5FD72E830}" type="datetimeFigureOut">
+            <a:fld id="{4E580725-939A-4032-91AA-1130D331B466}" type="datetime1">
               <a:rPr lang="de-CH" smtClean="0"/>
-              <a:t>30.03.2024</a:t>
+              <a:t>02.04.2024</a:t>
             </a:fld>
             <a:endParaRPr lang="de-CH"/>
           </a:p>
@@ -2113,9 +2491,9 @@
           <a:bodyPr/>
           <a:lstStyle/>
           <a:p>
-            <a:fld id="{AC48E7B0-EC00-4138-BD16-7BD5FD72E830}" type="datetimeFigureOut">
+            <a:fld id="{713AC88D-89D9-4A31-AA9D-0A1B491A6F79}" type="datetime1">
               <a:rPr lang="de-CH" smtClean="0"/>
-              <a:t>30.03.2024</a:t>
+              <a:t>02.04.2024</a:t>
             </a:fld>
             <a:endParaRPr lang="de-CH"/>
           </a:p>
@@ -2426,9 +2804,9 @@
           <a:bodyPr/>
           <a:lstStyle/>
           <a:p>
-            <a:fld id="{AC48E7B0-EC00-4138-BD16-7BD5FD72E830}" type="datetimeFigureOut">
+            <a:fld id="{B527A2A9-3C12-4894-B32B-2D82EBAAC609}" type="datetime1">
               <a:rPr lang="de-CH" smtClean="0"/>
-              <a:t>30.03.2024</a:t>
+              <a:t>02.04.2024</a:t>
             </a:fld>
             <a:endParaRPr lang="de-CH"/>
           </a:p>
@@ -2715,9 +3093,9 @@
           <a:bodyPr/>
           <a:lstStyle/>
           <a:p>
-            <a:fld id="{AC48E7B0-EC00-4138-BD16-7BD5FD72E830}" type="datetimeFigureOut">
+            <a:fld id="{BEFCB01E-2A41-4A6F-892D-4F257555E61F}" type="datetime1">
               <a:rPr lang="de-CH" smtClean="0"/>
-              <a:t>30.03.2024</a:t>
+              <a:t>02.04.2024</a:t>
             </a:fld>
             <a:endParaRPr lang="de-CH"/>
           </a:p>
@@ -2973,9 +3351,9 @@
             </a:lvl1pPr>
           </a:lstStyle>
           <a:p>
-            <a:fld id="{AC48E7B0-EC00-4138-BD16-7BD5FD72E830}" type="datetimeFigureOut">
+            <a:fld id="{BC6FB5C0-F549-4606-B4DB-828B69281519}" type="datetime1">
               <a:rPr lang="de-CH" smtClean="0"/>
-              <a:t>30.03.2024</a:t>
+              <a:t>02.04.2024</a:t>
             </a:fld>
             <a:endParaRPr lang="de-CH"/>
           </a:p>
@@ -3053,21 +3431,16 @@
           <a:bodyPr vert="horz" lIns="91440" tIns="45720" rIns="91440" bIns="45720" rtlCol="0" anchor="ctr"/>
           <a:lstStyle>
             <a:lvl1pPr algn="r">
-              <a:defRPr sz="1200">
-                <a:solidFill>
-                  <a:schemeClr val="tx1">
-                    <a:tint val="82000"/>
-                  </a:schemeClr>
-                </a:solidFill>
-              </a:defRPr>
+              <a:defRPr lang="de-CH" sz="1400" b="1" smtClean="0"/>
             </a:lvl1pPr>
           </a:lstStyle>
           <a:p>
             <a:fld id="{6CC38E0F-6087-4576-8364-C865CA5816FE}" type="slidenum">
               <a:rPr lang="de-CH" smtClean="0"/>
+              <a:pPr/>
               <a:t>‹Nr.›</a:t>
             </a:fld>
-            <a:endParaRPr lang="de-CH"/>
+            <a:endParaRPr lang="de-CH" dirty="0"/>
           </a:p>
         </p:txBody>
       </p:sp>
@@ -3092,6 +3465,7 @@
     <p:sldLayoutId id="2147483658" r:id="rId10"/>
     <p:sldLayoutId id="2147483659" r:id="rId11"/>
   </p:sldLayoutIdLst>
+  <p:hf hdr="0" ftr="0" dt="0"/>
   <p:txStyles>
     <p:titleStyle>
       <a:lvl1pPr algn="l" defTabSz="914400" rtl="0" eaLnBrk="1" latinLnBrk="0" hangingPunct="1">
@@ -3372,6 +3746,22 @@
       </a:lvl9pPr>
     </p:otherStyle>
   </p:txStyles>
+  <p:extLst>
+    <p:ext uri="{27BBF7A9-308A-43DC-89C8-2F10F3537804}">
+      <p15:sldGuideLst xmlns:p15="http://schemas.microsoft.com/office/powerpoint/2012/main">
+        <p15:guide id="1" orient="horz" pos="2160" userDrawn="1">
+          <p15:clr>
+            <a:srgbClr val="F26B43"/>
+          </p15:clr>
+        </p15:guide>
+        <p15:guide id="2" pos="3840" userDrawn="1">
+          <p15:clr>
+            <a:srgbClr val="F26B43"/>
+          </p15:clr>
+        </p15:guide>
+      </p15:sldGuideLst>
+    </p:ext>
+  </p:extLst>
 </p:sldMaster>
 </file>
 
@@ -6097,6 +6487,35 @@
           </a:p>
         </p:txBody>
       </p:sp>
+      <p:sp>
+        <p:nvSpPr>
+          <p:cNvPr id="2" name="Foliennummernplatzhalter 1">
+            <a:extLst>
+              <a:ext uri="{FF2B5EF4-FFF2-40B4-BE49-F238E27FC236}">
+                <a16:creationId xmlns:a16="http://schemas.microsoft.com/office/drawing/2014/main" id="{2C5E0C80-24E1-B4D9-9659-FEC1C6A71AB0}"/>
+              </a:ext>
+            </a:extLst>
+          </p:cNvPr>
+          <p:cNvSpPr>
+            <a:spLocks noGrp="1"/>
+          </p:cNvSpPr>
+          <p:nvPr>
+            <p:ph type="sldNum" sz="quarter" idx="12"/>
+          </p:nvPr>
+        </p:nvSpPr>
+        <p:spPr/>
+        <p:txBody>
+          <a:bodyPr/>
+          <a:lstStyle/>
+          <a:p>
+            <a:fld id="{6CC38E0F-6087-4576-8364-C865CA5816FE}" type="slidenum">
+              <a:rPr lang="de-CH" smtClean="0"/>
+              <a:t>2</a:t>
+            </a:fld>
+            <a:endParaRPr lang="de-CH"/>
+          </a:p>
+        </p:txBody>
+      </p:sp>
     </p:spTree>
     <p:extLst>
       <p:ext uri="{BB962C8B-B14F-4D97-AF65-F5344CB8AC3E}">
@@ -6107,13 +6526,13 @@
   <p:clrMapOvr>
     <a:masterClrMapping/>
   </p:clrMapOvr>
-  <mc:AlternateContent xmlns:mc="http://schemas.openxmlformats.org/markup-compatibility/2006">
-    <mc:Choice xmlns:p159="http://schemas.microsoft.com/office/powerpoint/2015/09/main" Requires="p159">
+  <mc:AlternateContent xmlns:mc="http://schemas.openxmlformats.org/markup-compatibility/2006" xmlns:p159="http://schemas.microsoft.com/office/powerpoint/2015/09/main">
+    <mc:Choice Requires="p159">
       <p:transition xmlns:p14="http://schemas.microsoft.com/office/powerpoint/2010/main" spd="slow" p14:dur="2000">
         <p159:morph option="byObject"/>
       </p:transition>
     </mc:Choice>
-    <mc:Fallback>
+    <mc:Fallback xmlns="">
       <p:transition spd="slow">
         <p:fade/>
       </p:transition>
@@ -8170,6 +8589,35 @@
           </a:p>
         </p:txBody>
       </p:sp>
+      <p:sp>
+        <p:nvSpPr>
+          <p:cNvPr id="19" name="Foliennummernplatzhalter 18">
+            <a:extLst>
+              <a:ext uri="{FF2B5EF4-FFF2-40B4-BE49-F238E27FC236}">
+                <a16:creationId xmlns:a16="http://schemas.microsoft.com/office/drawing/2014/main" id="{D7313B72-2398-C664-5762-62DF0087DE90}"/>
+              </a:ext>
+            </a:extLst>
+          </p:cNvPr>
+          <p:cNvSpPr>
+            <a:spLocks noGrp="1"/>
+          </p:cNvSpPr>
+          <p:nvPr>
+            <p:ph type="sldNum" sz="quarter" idx="12"/>
+          </p:nvPr>
+        </p:nvSpPr>
+        <p:spPr/>
+        <p:txBody>
+          <a:bodyPr/>
+          <a:lstStyle/>
+          <a:p>
+            <a:fld id="{6CC38E0F-6087-4576-8364-C865CA5816FE}" type="slidenum">
+              <a:rPr lang="de-CH" smtClean="0"/>
+              <a:t>3</a:t>
+            </a:fld>
+            <a:endParaRPr lang="de-CH"/>
+          </a:p>
+        </p:txBody>
+      </p:sp>
     </p:spTree>
     <p:extLst>
       <p:ext uri="{BB962C8B-B14F-4D97-AF65-F5344CB8AC3E}">
@@ -8180,13 +8628,13 @@
   <p:clrMapOvr>
     <a:masterClrMapping/>
   </p:clrMapOvr>
-  <mc:AlternateContent xmlns:mc="http://schemas.openxmlformats.org/markup-compatibility/2006">
-    <mc:Choice xmlns:p159="http://schemas.microsoft.com/office/powerpoint/2015/09/main" Requires="p159">
+  <mc:AlternateContent xmlns:mc="http://schemas.openxmlformats.org/markup-compatibility/2006" xmlns:p159="http://schemas.microsoft.com/office/powerpoint/2015/09/main">
+    <mc:Choice Requires="p159">
       <p:transition xmlns:p14="http://schemas.microsoft.com/office/powerpoint/2010/main" spd="slow" p14:dur="2000">
         <p159:morph option="byObject"/>
       </p:transition>
     </mc:Choice>
-    <mc:Fallback>
+    <mc:Fallback xmlns="">
       <p:transition spd="slow">
         <p:fade/>
       </p:transition>
@@ -8832,56 +9280,6 @@
       </p:grpSpPr>
       <p:sp>
         <p:nvSpPr>
-          <p:cNvPr id="2" name="Titel 1">
-            <a:extLst>
-              <a:ext uri="{FF2B5EF4-FFF2-40B4-BE49-F238E27FC236}">
-                <a16:creationId xmlns:a16="http://schemas.microsoft.com/office/drawing/2014/main" id="{FF534EB4-C1BD-72A2-055F-B56CD43994D3}"/>
-              </a:ext>
-            </a:extLst>
-          </p:cNvPr>
-          <p:cNvSpPr>
-            <a:spLocks noGrp="1"/>
-          </p:cNvSpPr>
-          <p:nvPr>
-            <p:ph type="title"/>
-          </p:nvPr>
-        </p:nvSpPr>
-        <p:spPr/>
-        <p:txBody>
-          <a:bodyPr/>
-          <a:lstStyle/>
-          <a:p>
-            <a:endParaRPr lang="de-CH" dirty="0"/>
-          </a:p>
-        </p:txBody>
-      </p:sp>
-      <p:sp>
-        <p:nvSpPr>
-          <p:cNvPr id="3" name="Inhaltsplatzhalter 2">
-            <a:extLst>
-              <a:ext uri="{FF2B5EF4-FFF2-40B4-BE49-F238E27FC236}">
-                <a16:creationId xmlns:a16="http://schemas.microsoft.com/office/drawing/2014/main" id="{9DD252F4-E30B-1561-E14E-74B9DB697713}"/>
-              </a:ext>
-            </a:extLst>
-          </p:cNvPr>
-          <p:cNvSpPr>
-            <a:spLocks noGrp="1"/>
-          </p:cNvSpPr>
-          <p:nvPr>
-            <p:ph idx="1"/>
-          </p:nvPr>
-        </p:nvSpPr>
-        <p:spPr/>
-        <p:txBody>
-          <a:bodyPr/>
-          <a:lstStyle/>
-          <a:p>
-            <a:endParaRPr lang="de-CH"/>
-          </a:p>
-        </p:txBody>
-      </p:sp>
-      <p:sp>
-        <p:nvSpPr>
           <p:cNvPr id="4" name="Rechteck 3">
             <a:extLst>
               <a:ext uri="{FF2B5EF4-FFF2-40B4-BE49-F238E27FC236}">
@@ -9765,6 +10163,174 @@
                 <a:schemeClr val="bg1"/>
               </a:solidFill>
             </a:endParaRPr>
+          </a:p>
+        </p:txBody>
+      </p:sp>
+      <p:sp>
+        <p:nvSpPr>
+          <p:cNvPr id="12" name="Foliennummernplatzhalter 11">
+            <a:extLst>
+              <a:ext uri="{FF2B5EF4-FFF2-40B4-BE49-F238E27FC236}">
+                <a16:creationId xmlns:a16="http://schemas.microsoft.com/office/drawing/2014/main" id="{F4B80C09-3B7E-2E25-BCC8-E5D675B4964E}"/>
+              </a:ext>
+            </a:extLst>
+          </p:cNvPr>
+          <p:cNvSpPr>
+            <a:spLocks noGrp="1"/>
+          </p:cNvSpPr>
+          <p:nvPr>
+            <p:ph type="sldNum" sz="quarter" idx="12"/>
+          </p:nvPr>
+        </p:nvSpPr>
+        <p:spPr/>
+        <p:txBody>
+          <a:bodyPr/>
+          <a:lstStyle/>
+          <a:p>
+            <a:fld id="{6CC38E0F-6087-4576-8364-C865CA5816FE}" type="slidenum">
+              <a:rPr lang="de-CH" smtClean="0"/>
+              <a:t>4</a:t>
+            </a:fld>
+            <a:endParaRPr lang="de-CH"/>
+          </a:p>
+        </p:txBody>
+      </p:sp>
+      <p:pic>
+        <p:nvPicPr>
+          <p:cNvPr id="3" name="Grafik 2">
+            <a:extLst>
+              <a:ext uri="{FF2B5EF4-FFF2-40B4-BE49-F238E27FC236}">
+                <a16:creationId xmlns:a16="http://schemas.microsoft.com/office/drawing/2014/main" id="{0685CED8-C976-DC4F-CF35-10208327FBAC}"/>
+              </a:ext>
+            </a:extLst>
+          </p:cNvPr>
+          <p:cNvPicPr>
+            <a:picLocks noChangeAspect="1"/>
+          </p:cNvPicPr>
+          <p:nvPr/>
+        </p:nvPicPr>
+        <p:blipFill rotWithShape="1">
+          <a:blip r:embed="rId14"/>
+          <a:srcRect l="2692"/>
+          <a:stretch/>
+        </p:blipFill>
+        <p:spPr>
+          <a:xfrm>
+            <a:off x="2977939" y="647711"/>
+            <a:ext cx="8264074" cy="3243190"/>
+          </a:xfrm>
+          <a:prstGeom prst="rect">
+            <a:avLst/>
+          </a:prstGeom>
+        </p:spPr>
+      </p:pic>
+      <p:sp>
+        <p:nvSpPr>
+          <p:cNvPr id="20" name="Ellipse 19">
+            <a:extLst>
+              <a:ext uri="{FF2B5EF4-FFF2-40B4-BE49-F238E27FC236}">
+                <a16:creationId xmlns:a16="http://schemas.microsoft.com/office/drawing/2014/main" id="{A9437325-4330-FB4A-083F-F28FF13D0915}"/>
+              </a:ext>
+            </a:extLst>
+          </p:cNvPr>
+          <p:cNvSpPr/>
+          <p:nvPr/>
+        </p:nvSpPr>
+        <p:spPr>
+          <a:xfrm>
+            <a:off x="5994069" y="2184495"/>
+            <a:ext cx="319632" cy="319632"/>
+          </a:xfrm>
+          <a:prstGeom prst="ellipse">
+            <a:avLst/>
+          </a:prstGeom>
+          <a:solidFill>
+            <a:srgbClr val="773341"/>
+          </a:solidFill>
+          <a:ln>
+            <a:noFill/>
+          </a:ln>
+        </p:spPr>
+        <p:style>
+          <a:lnRef idx="2">
+            <a:schemeClr val="accent1">
+              <a:shade val="15000"/>
+            </a:schemeClr>
+          </a:lnRef>
+          <a:fillRef idx="1">
+            <a:schemeClr val="accent1"/>
+          </a:fillRef>
+          <a:effectRef idx="0">
+            <a:schemeClr val="accent1"/>
+          </a:effectRef>
+          <a:fontRef idx="minor">
+            <a:schemeClr val="lt1"/>
+          </a:fontRef>
+        </p:style>
+        <p:txBody>
+          <a:bodyPr rtlCol="0" anchor="ctr"/>
+          <a:lstStyle/>
+          <a:p>
+            <a:pPr algn="ctr"/>
+            <a:r>
+              <a:rPr lang="de-CH" sz="2400" dirty="0"/>
+              <a:t>A</a:t>
+            </a:r>
+          </a:p>
+        </p:txBody>
+      </p:sp>
+      <p:sp>
+        <p:nvSpPr>
+          <p:cNvPr id="24" name="Ellipse 23">
+            <a:extLst>
+              <a:ext uri="{FF2B5EF4-FFF2-40B4-BE49-F238E27FC236}">
+                <a16:creationId xmlns:a16="http://schemas.microsoft.com/office/drawing/2014/main" id="{29F74324-B6EC-5C47-085F-1DD3B669146E}"/>
+              </a:ext>
+            </a:extLst>
+          </p:cNvPr>
+          <p:cNvSpPr/>
+          <p:nvPr/>
+        </p:nvSpPr>
+        <p:spPr>
+          <a:xfrm>
+            <a:off x="5994069" y="2596555"/>
+            <a:ext cx="319632" cy="319632"/>
+          </a:xfrm>
+          <a:prstGeom prst="ellipse">
+            <a:avLst/>
+          </a:prstGeom>
+          <a:solidFill>
+            <a:srgbClr val="773341"/>
+          </a:solidFill>
+          <a:ln>
+            <a:noFill/>
+          </a:ln>
+        </p:spPr>
+        <p:style>
+          <a:lnRef idx="2">
+            <a:schemeClr val="accent1">
+              <a:shade val="15000"/>
+            </a:schemeClr>
+          </a:lnRef>
+          <a:fillRef idx="1">
+            <a:schemeClr val="accent1"/>
+          </a:fillRef>
+          <a:effectRef idx="0">
+            <a:schemeClr val="accent1"/>
+          </a:effectRef>
+          <a:fontRef idx="minor">
+            <a:schemeClr val="lt1"/>
+          </a:fontRef>
+        </p:style>
+        <p:txBody>
+          <a:bodyPr rtlCol="0" anchor="ctr"/>
+          <a:lstStyle/>
+          <a:p>
+            <a:pPr algn="ctr"/>
+            <a:r>
+              <a:rPr lang="de-CH" sz="2400" dirty="0"/>
+              <a:t>T</a:t>
+            </a:r>
           </a:p>
         </p:txBody>
       </p:sp>
@@ -10094,4 +10660,319 @@
     </a:ext>
   </a:extLst>
 </a:theme>
+</file>
+
+<file path=ppt/theme/theme2.xml><?xml version="1.0" encoding="utf-8"?>
+<a:theme xmlns:a="http://schemas.openxmlformats.org/drawingml/2006/main" name="Office">
+  <a:themeElements>
+    <a:clrScheme name="Office">
+      <a:dk1>
+        <a:sysClr val="windowText" lastClr="000000"/>
+      </a:dk1>
+      <a:lt1>
+        <a:sysClr val="window" lastClr="FFFFFF"/>
+      </a:lt1>
+      <a:dk2>
+        <a:srgbClr val="0E2841"/>
+      </a:dk2>
+      <a:lt2>
+        <a:srgbClr val="E8E8E8"/>
+      </a:lt2>
+      <a:accent1>
+        <a:srgbClr val="156082"/>
+      </a:accent1>
+      <a:accent2>
+        <a:srgbClr val="E97132"/>
+      </a:accent2>
+      <a:accent3>
+        <a:srgbClr val="196B24"/>
+      </a:accent3>
+      <a:accent4>
+        <a:srgbClr val="0F9ED5"/>
+      </a:accent4>
+      <a:accent5>
+        <a:srgbClr val="A02B93"/>
+      </a:accent5>
+      <a:accent6>
+        <a:srgbClr val="4EA72E"/>
+      </a:accent6>
+      <a:hlink>
+        <a:srgbClr val="467886"/>
+      </a:hlink>
+      <a:folHlink>
+        <a:srgbClr val="96607D"/>
+      </a:folHlink>
+    </a:clrScheme>
+    <a:fontScheme name="Office">
+      <a:majorFont>
+        <a:latin typeface="Aptos Display" panose="02110004020202020204"/>
+        <a:ea typeface=""/>
+        <a:cs typeface=""/>
+        <a:font script="Jpan" typeface="游ゴシック Light"/>
+        <a:font script="Hang" typeface="맑은 고딕"/>
+        <a:font script="Hans" typeface="等线 Light"/>
+        <a:font script="Hant" typeface="新細明體"/>
+        <a:font script="Arab" typeface="Times New Roman"/>
+        <a:font script="Hebr" typeface="Times New Roman"/>
+        <a:font script="Thai" typeface="Angsana New"/>
+        <a:font script="Ethi" typeface="Nyala"/>
+        <a:font script="Beng" typeface="Vrinda"/>
+        <a:font script="Gujr" typeface="Shruti"/>
+        <a:font script="Khmr" typeface="MoolBoran"/>
+        <a:font script="Knda" typeface="Tunga"/>
+        <a:font script="Guru" typeface="Raavi"/>
+        <a:font script="Cans" typeface="Euphemia"/>
+        <a:font script="Cher" typeface="Plantagenet Cherokee"/>
+        <a:font script="Yiii" typeface="Microsoft Yi Baiti"/>
+        <a:font script="Tibt" typeface="Microsoft Himalaya"/>
+        <a:font script="Thaa" typeface="MV Boli"/>
+        <a:font script="Deva" typeface="Mangal"/>
+        <a:font script="Telu" typeface="Gautami"/>
+        <a:font script="Taml" typeface="Latha"/>
+        <a:font script="Syrc" typeface="Estrangelo Edessa"/>
+        <a:font script="Orya" typeface="Kalinga"/>
+        <a:font script="Mlym" typeface="Kartika"/>
+        <a:font script="Laoo" typeface="DokChampa"/>
+        <a:font script="Sinh" typeface="Iskoola Pota"/>
+        <a:font script="Mong" typeface="Mongolian Baiti"/>
+        <a:font script="Viet" typeface="Times New Roman"/>
+        <a:font script="Uigh" typeface="Microsoft Uighur"/>
+        <a:font script="Geor" typeface="Sylfaen"/>
+        <a:font script="Armn" typeface="Arial"/>
+        <a:font script="Bugi" typeface="Leelawadee UI"/>
+        <a:font script="Bopo" typeface="Microsoft JhengHei"/>
+        <a:font script="Java" typeface="Javanese Text"/>
+        <a:font script="Lisu" typeface="Segoe UI"/>
+        <a:font script="Mymr" typeface="Myanmar Text"/>
+        <a:font script="Nkoo" typeface="Ebrima"/>
+        <a:font script="Olck" typeface="Nirmala UI"/>
+        <a:font script="Osma" typeface="Ebrima"/>
+        <a:font script="Phag" typeface="Phagspa"/>
+        <a:font script="Syrn" typeface="Estrangelo Edessa"/>
+        <a:font script="Syrj" typeface="Estrangelo Edessa"/>
+        <a:font script="Syre" typeface="Estrangelo Edessa"/>
+        <a:font script="Sora" typeface="Nirmala UI"/>
+        <a:font script="Tale" typeface="Microsoft Tai Le"/>
+        <a:font script="Talu" typeface="Microsoft New Tai Lue"/>
+        <a:font script="Tfng" typeface="Ebrima"/>
+      </a:majorFont>
+      <a:minorFont>
+        <a:latin typeface="Aptos" panose="02110004020202020204"/>
+        <a:ea typeface=""/>
+        <a:cs typeface=""/>
+        <a:font script="Jpan" typeface="游ゴシック"/>
+        <a:font script="Hang" typeface="맑은 고딕"/>
+        <a:font script="Hans" typeface="等线"/>
+        <a:font script="Hant" typeface="新細明體"/>
+        <a:font script="Arab" typeface="Arial"/>
+        <a:font script="Hebr" typeface="Arial"/>
+        <a:font script="Thai" typeface="Cordia New"/>
+        <a:font script="Ethi" typeface="Nyala"/>
+        <a:font script="Beng" typeface="Vrinda"/>
+        <a:font script="Gujr" typeface="Shruti"/>
+        <a:font script="Khmr" typeface="DaunPenh"/>
+        <a:font script="Knda" typeface="Tunga"/>
+        <a:font script="Guru" typeface="Raavi"/>
+        <a:font script="Cans" typeface="Euphemia"/>
+        <a:font script="Cher" typeface="Plantagenet Cherokee"/>
+        <a:font script="Yiii" typeface="Microsoft Yi Baiti"/>
+        <a:font script="Tibt" typeface="Microsoft Himalaya"/>
+        <a:font script="Thaa" typeface="MV Boli"/>
+        <a:font script="Deva" typeface="Mangal"/>
+        <a:font script="Telu" typeface="Gautami"/>
+        <a:font script="Taml" typeface="Latha"/>
+        <a:font script="Syrc" typeface="Estrangelo Edessa"/>
+        <a:font script="Orya" typeface="Kalinga"/>
+        <a:font script="Mlym" typeface="Kartika"/>
+        <a:font script="Laoo" typeface="DokChampa"/>
+        <a:font script="Sinh" typeface="Iskoola Pota"/>
+        <a:font script="Mong" typeface="Mongolian Baiti"/>
+        <a:font script="Viet" typeface="Arial"/>
+        <a:font script="Uigh" typeface="Microsoft Uighur"/>
+        <a:font script="Geor" typeface="Sylfaen"/>
+        <a:font script="Armn" typeface="Arial"/>
+        <a:font script="Bugi" typeface="Leelawadee UI"/>
+        <a:font script="Bopo" typeface="Microsoft JhengHei"/>
+        <a:font script="Java" typeface="Javanese Text"/>
+        <a:font script="Lisu" typeface="Segoe UI"/>
+        <a:font script="Mymr" typeface="Myanmar Text"/>
+        <a:font script="Nkoo" typeface="Ebrima"/>
+        <a:font script="Olck" typeface="Nirmala UI"/>
+        <a:font script="Osma" typeface="Ebrima"/>
+        <a:font script="Phag" typeface="Phagspa"/>
+        <a:font script="Syrn" typeface="Estrangelo Edessa"/>
+        <a:font script="Syrj" typeface="Estrangelo Edessa"/>
+        <a:font script="Syre" typeface="Estrangelo Edessa"/>
+        <a:font script="Sora" typeface="Nirmala UI"/>
+        <a:font script="Tale" typeface="Microsoft Tai Le"/>
+        <a:font script="Talu" typeface="Microsoft New Tai Lue"/>
+        <a:font script="Tfng" typeface="Ebrima"/>
+      </a:minorFont>
+    </a:fontScheme>
+    <a:fmtScheme name="Office">
+      <a:fillStyleLst>
+        <a:solidFill>
+          <a:schemeClr val="phClr"/>
+        </a:solidFill>
+        <a:gradFill rotWithShape="1">
+          <a:gsLst>
+            <a:gs pos="0">
+              <a:schemeClr val="phClr">
+                <a:lumMod val="110000"/>
+                <a:satMod val="105000"/>
+                <a:tint val="67000"/>
+              </a:schemeClr>
+            </a:gs>
+            <a:gs pos="50000">
+              <a:schemeClr val="phClr">
+                <a:lumMod val="105000"/>
+                <a:satMod val="103000"/>
+                <a:tint val="73000"/>
+              </a:schemeClr>
+            </a:gs>
+            <a:gs pos="100000">
+              <a:schemeClr val="phClr">
+                <a:lumMod val="105000"/>
+                <a:satMod val="109000"/>
+                <a:tint val="81000"/>
+              </a:schemeClr>
+            </a:gs>
+          </a:gsLst>
+          <a:lin ang="5400000" scaled="0"/>
+        </a:gradFill>
+        <a:gradFill rotWithShape="1">
+          <a:gsLst>
+            <a:gs pos="0">
+              <a:schemeClr val="phClr">
+                <a:satMod val="103000"/>
+                <a:lumMod val="102000"/>
+                <a:tint val="94000"/>
+              </a:schemeClr>
+            </a:gs>
+            <a:gs pos="50000">
+              <a:schemeClr val="phClr">
+                <a:satMod val="110000"/>
+                <a:lumMod val="100000"/>
+                <a:shade val="100000"/>
+              </a:schemeClr>
+            </a:gs>
+            <a:gs pos="100000">
+              <a:schemeClr val="phClr">
+                <a:lumMod val="99000"/>
+                <a:satMod val="120000"/>
+                <a:shade val="78000"/>
+              </a:schemeClr>
+            </a:gs>
+          </a:gsLst>
+          <a:lin ang="5400000" scaled="0"/>
+        </a:gradFill>
+      </a:fillStyleLst>
+      <a:lnStyleLst>
+        <a:ln w="12700" cap="flat" cmpd="sng" algn="ctr">
+          <a:solidFill>
+            <a:schemeClr val="phClr"/>
+          </a:solidFill>
+          <a:prstDash val="solid"/>
+          <a:miter lim="800000"/>
+        </a:ln>
+        <a:ln w="19050" cap="flat" cmpd="sng" algn="ctr">
+          <a:solidFill>
+            <a:schemeClr val="phClr"/>
+          </a:solidFill>
+          <a:prstDash val="solid"/>
+          <a:miter lim="800000"/>
+        </a:ln>
+        <a:ln w="25400" cap="flat" cmpd="sng" algn="ctr">
+          <a:solidFill>
+            <a:schemeClr val="phClr"/>
+          </a:solidFill>
+          <a:prstDash val="solid"/>
+          <a:miter lim="800000"/>
+        </a:ln>
+      </a:lnStyleLst>
+      <a:effectStyleLst>
+        <a:effectStyle>
+          <a:effectLst/>
+        </a:effectStyle>
+        <a:effectStyle>
+          <a:effectLst/>
+        </a:effectStyle>
+        <a:effectStyle>
+          <a:effectLst>
+            <a:outerShdw blurRad="57150" dist="19050" dir="5400000" algn="ctr" rotWithShape="0">
+              <a:srgbClr val="000000">
+                <a:alpha val="63000"/>
+              </a:srgbClr>
+            </a:outerShdw>
+          </a:effectLst>
+        </a:effectStyle>
+      </a:effectStyleLst>
+      <a:bgFillStyleLst>
+        <a:solidFill>
+          <a:schemeClr val="phClr"/>
+        </a:solidFill>
+        <a:solidFill>
+          <a:schemeClr val="phClr">
+            <a:tint val="95000"/>
+            <a:satMod val="170000"/>
+          </a:schemeClr>
+        </a:solidFill>
+        <a:gradFill rotWithShape="1">
+          <a:gsLst>
+            <a:gs pos="0">
+              <a:schemeClr val="phClr">
+                <a:tint val="93000"/>
+                <a:satMod val="150000"/>
+                <a:shade val="98000"/>
+                <a:lumMod val="102000"/>
+              </a:schemeClr>
+            </a:gs>
+            <a:gs pos="50000">
+              <a:schemeClr val="phClr">
+                <a:tint val="98000"/>
+                <a:satMod val="130000"/>
+                <a:shade val="90000"/>
+                <a:lumMod val="103000"/>
+              </a:schemeClr>
+            </a:gs>
+            <a:gs pos="100000">
+              <a:schemeClr val="phClr">
+                <a:shade val="63000"/>
+                <a:satMod val="120000"/>
+              </a:schemeClr>
+            </a:gs>
+          </a:gsLst>
+          <a:lin ang="5400000" scaled="0"/>
+        </a:gradFill>
+      </a:bgFillStyleLst>
+    </a:fmtScheme>
+  </a:themeElements>
+  <a:objectDefaults>
+    <a:lnDef>
+      <a:spPr/>
+      <a:bodyPr/>
+      <a:lstStyle/>
+      <a:style>
+        <a:lnRef idx="2">
+          <a:schemeClr val="accent1"/>
+        </a:lnRef>
+        <a:fillRef idx="0">
+          <a:schemeClr val="accent1"/>
+        </a:fillRef>
+        <a:effectRef idx="1">
+          <a:schemeClr val="accent1"/>
+        </a:effectRef>
+        <a:fontRef idx="minor">
+          <a:schemeClr val="tx1"/>
+        </a:fontRef>
+      </a:style>
+    </a:lnDef>
+  </a:objectDefaults>
+  <a:extraClrSchemeLst/>
+  <a:extLst>
+    <a:ext uri="{05A4C25C-085E-4340-85A3-A5531E510DB2}">
+      <thm15:themeFamily xmlns:thm15="http://schemas.microsoft.com/office/thememl/2012/main" name="Office Theme" id="{2E142A2C-CD16-42D6-873A-C26D2A0506FA}" vid="{1BDDFF52-6CD6-40A5-AB3C-68EB2F1E4D0A}"/>
+    </a:ext>
+  </a:extLst>
+</a:theme>
 </file>
</xml_diff>